<commit_message>
latest version of lesson 1
</commit_message>
<xml_diff>
--- a/lesson_1/Lesson - 1.pptx
+++ b/lesson_1/Lesson - 1.pptx
@@ -14,10 +14,10 @@
     <p:sldId id="258" r:id="rId5"/>
     <p:sldId id="265" r:id="rId6"/>
     <p:sldId id="266" r:id="rId7"/>
-    <p:sldId id="269" r:id="rId8"/>
-    <p:sldId id="267" r:id="rId9"/>
-    <p:sldId id="268" r:id="rId10"/>
-    <p:sldId id="270" r:id="rId11"/>
+    <p:sldId id="267" r:id="rId8"/>
+    <p:sldId id="268" r:id="rId9"/>
+    <p:sldId id="270" r:id="rId10"/>
+    <p:sldId id="269" r:id="rId11"/>
     <p:sldId id="259" r:id="rId12"/>
     <p:sldId id="261" r:id="rId13"/>
     <p:sldId id="263" r:id="rId14"/>
@@ -209,7 +209,7 @@
           <a:p>
             <a:fld id="{5F23CF50-52E1-483B-927E-B1E7E65D950B}" type="datetimeFigureOut">
               <a:rPr lang="en-US" smtClean="0"/>
-              <a:t>12/29/2015</a:t>
+              <a:t>1/6/2016</a:t>
             </a:fld>
             <a:endParaRPr lang="en-US"/>
           </a:p>
@@ -546,7 +546,7 @@
           <a:p>
             <a:fld id="{95723052-E1D2-4F2F-80A6-572C25893FC4}" type="slidenum">
               <a:rPr lang="en-US" smtClean="0"/>
-              <a:t>8</a:t>
+              <a:t>7</a:t>
             </a:fld>
             <a:endParaRPr lang="en-US"/>
           </a:p>
@@ -664,7 +664,7 @@
           <a:p>
             <a:fld id="{95723052-E1D2-4F2F-80A6-572C25893FC4}" type="slidenum">
               <a:rPr lang="en-US" smtClean="0"/>
-              <a:t>9</a:t>
+              <a:t>8</a:t>
             </a:fld>
             <a:endParaRPr lang="en-US"/>
           </a:p>
@@ -869,7 +869,7 @@
           <a:p>
             <a:fld id="{9378A345-8019-4506-93BA-64D760313A5D}" type="datetimeFigureOut">
               <a:rPr lang="en-US" smtClean="0"/>
-              <a:t>12/29/2015</a:t>
+              <a:t>1/6/2016</a:t>
             </a:fld>
             <a:endParaRPr lang="en-US"/>
           </a:p>
@@ -1144,7 +1144,7 @@
           <a:p>
             <a:fld id="{9378A345-8019-4506-93BA-64D760313A5D}" type="datetimeFigureOut">
               <a:rPr lang="en-US" smtClean="0"/>
-              <a:t>12/29/2015</a:t>
+              <a:t>1/6/2016</a:t>
             </a:fld>
             <a:endParaRPr lang="en-US"/>
           </a:p>
@@ -1338,7 +1338,7 @@
           <a:p>
             <a:fld id="{9378A345-8019-4506-93BA-64D760313A5D}" type="datetimeFigureOut">
               <a:rPr lang="en-US" smtClean="0"/>
-              <a:t>12/29/2015</a:t>
+              <a:t>1/6/2016</a:t>
             </a:fld>
             <a:endParaRPr lang="en-US"/>
           </a:p>
@@ -1611,7 +1611,7 @@
           <a:p>
             <a:fld id="{9378A345-8019-4506-93BA-64D760313A5D}" type="datetimeFigureOut">
               <a:rPr lang="en-US" smtClean="0"/>
-              <a:t>12/29/2015</a:t>
+              <a:t>1/6/2016</a:t>
             </a:fld>
             <a:endParaRPr lang="en-US"/>
           </a:p>
@@ -1952,7 +1952,7 @@
           <a:p>
             <a:fld id="{9378A345-8019-4506-93BA-64D760313A5D}" type="datetimeFigureOut">
               <a:rPr lang="en-US" smtClean="0"/>
-              <a:t>12/29/2015</a:t>
+              <a:t>1/6/2016</a:t>
             </a:fld>
             <a:endParaRPr lang="en-US"/>
           </a:p>
@@ -2575,7 +2575,7 @@
           <a:p>
             <a:fld id="{9378A345-8019-4506-93BA-64D760313A5D}" type="datetimeFigureOut">
               <a:rPr lang="en-US" smtClean="0"/>
-              <a:t>12/29/2015</a:t>
+              <a:t>1/6/2016</a:t>
             </a:fld>
             <a:endParaRPr lang="en-US"/>
           </a:p>
@@ -3435,7 +3435,7 @@
           <a:p>
             <a:fld id="{9378A345-8019-4506-93BA-64D760313A5D}" type="datetimeFigureOut">
               <a:rPr lang="en-US" smtClean="0"/>
-              <a:t>12/29/2015</a:t>
+              <a:t>1/6/2016</a:t>
             </a:fld>
             <a:endParaRPr lang="en-US"/>
           </a:p>
@@ -3605,7 +3605,7 @@
           <a:p>
             <a:fld id="{9378A345-8019-4506-93BA-64D760313A5D}" type="datetimeFigureOut">
               <a:rPr lang="en-US" smtClean="0"/>
-              <a:t>12/29/2015</a:t>
+              <a:t>1/6/2016</a:t>
             </a:fld>
             <a:endParaRPr lang="en-US"/>
           </a:p>
@@ -3785,7 +3785,7 @@
           <a:p>
             <a:fld id="{9378A345-8019-4506-93BA-64D760313A5D}" type="datetimeFigureOut">
               <a:rPr lang="en-US" smtClean="0"/>
-              <a:t>12/29/2015</a:t>
+              <a:t>1/6/2016</a:t>
             </a:fld>
             <a:endParaRPr lang="en-US"/>
           </a:p>
@@ -3955,7 +3955,7 @@
           <a:p>
             <a:fld id="{9378A345-8019-4506-93BA-64D760313A5D}" type="datetimeFigureOut">
               <a:rPr lang="en-US" smtClean="0"/>
-              <a:t>12/29/2015</a:t>
+              <a:t>1/6/2016</a:t>
             </a:fld>
             <a:endParaRPr lang="en-US"/>
           </a:p>
@@ -4202,7 +4202,7 @@
           <a:p>
             <a:fld id="{9378A345-8019-4506-93BA-64D760313A5D}" type="datetimeFigureOut">
               <a:rPr lang="en-US" smtClean="0"/>
-              <a:t>12/29/2015</a:t>
+              <a:t>1/6/2016</a:t>
             </a:fld>
             <a:endParaRPr lang="en-US"/>
           </a:p>
@@ -4494,7 +4494,7 @@
           <a:p>
             <a:fld id="{9378A345-8019-4506-93BA-64D760313A5D}" type="datetimeFigureOut">
               <a:rPr lang="en-US" smtClean="0"/>
-              <a:t>12/29/2015</a:t>
+              <a:t>1/6/2016</a:t>
             </a:fld>
             <a:endParaRPr lang="en-US"/>
           </a:p>
@@ -4938,7 +4938,7 @@
           <a:p>
             <a:fld id="{9378A345-8019-4506-93BA-64D760313A5D}" type="datetimeFigureOut">
               <a:rPr lang="en-US" smtClean="0"/>
-              <a:t>12/29/2015</a:t>
+              <a:t>1/6/2016</a:t>
             </a:fld>
             <a:endParaRPr lang="en-US"/>
           </a:p>
@@ -5056,7 +5056,7 @@
           <a:p>
             <a:fld id="{9378A345-8019-4506-93BA-64D760313A5D}" type="datetimeFigureOut">
               <a:rPr lang="en-US" smtClean="0"/>
-              <a:t>12/29/2015</a:t>
+              <a:t>1/6/2016</a:t>
             </a:fld>
             <a:endParaRPr lang="en-US"/>
           </a:p>
@@ -5151,7 +5151,7 @@
           <a:p>
             <a:fld id="{9378A345-8019-4506-93BA-64D760313A5D}" type="datetimeFigureOut">
               <a:rPr lang="en-US" smtClean="0"/>
-              <a:t>12/29/2015</a:t>
+              <a:t>1/6/2016</a:t>
             </a:fld>
             <a:endParaRPr lang="en-US"/>
           </a:p>
@@ -5430,7 +5430,7 @@
           <a:p>
             <a:fld id="{9378A345-8019-4506-93BA-64D760313A5D}" type="datetimeFigureOut">
               <a:rPr lang="en-US" smtClean="0"/>
-              <a:t>12/29/2015</a:t>
+              <a:t>1/6/2016</a:t>
             </a:fld>
             <a:endParaRPr lang="en-US"/>
           </a:p>
@@ -5705,7 +5705,7 @@
           <a:p>
             <a:fld id="{9378A345-8019-4506-93BA-64D760313A5D}" type="datetimeFigureOut">
               <a:rPr lang="en-US" smtClean="0"/>
-              <a:t>12/29/2015</a:t>
+              <a:t>1/6/2016</a:t>
             </a:fld>
             <a:endParaRPr lang="en-US"/>
           </a:p>
@@ -6134,7 +6134,7 @@
           <a:p>
             <a:fld id="{9378A345-8019-4506-93BA-64D760313A5D}" type="datetimeFigureOut">
               <a:rPr lang="en-US" smtClean="0"/>
-              <a:t>12/29/2015</a:t>
+              <a:t>1/6/2016</a:t>
             </a:fld>
             <a:endParaRPr lang="en-US"/>
           </a:p>
@@ -6755,7 +6755,7 @@
           <a:p>
             <a:r>
               <a:rPr lang="he-IL" dirty="0" smtClean="0"/>
-              <a:t>די עם ההדגמות</a:t>
+              <a:t>דוגמת לולאה בסיסית</a:t>
             </a:r>
             <a:endParaRPr lang="en-US" dirty="0"/>
           </a:p>
@@ -6776,11 +6776,62 @@
           <a:bodyPr/>
           <a:lstStyle/>
           <a:p>
+            <a:pPr marL="0" indent="0">
+              <a:buNone/>
+            </a:pPr>
+            <a:r>
+              <a:rPr lang="en-US" dirty="0"/>
+              <a:t>w</a:t>
+            </a:r>
+            <a:r>
+              <a:rPr lang="en-US" dirty="0" smtClean="0"/>
+              <a:t>hile ( true ) {</a:t>
+            </a:r>
+          </a:p>
+          <a:p>
+            <a:pPr marL="0" indent="0">
+              <a:buNone/>
+            </a:pPr>
+            <a:r>
+              <a:rPr lang="en-US" dirty="0"/>
+              <a:t>	</a:t>
+            </a:r>
+            <a:r>
+              <a:rPr lang="en-US" dirty="0" err="1" smtClean="0"/>
+              <a:t>do_action</a:t>
+            </a:r>
+            <a:r>
+              <a:rPr lang="en-US" dirty="0" smtClean="0"/>
+              <a:t>();</a:t>
+            </a:r>
+          </a:p>
+          <a:p>
+            <a:pPr marL="0" indent="0">
+              <a:buNone/>
+            </a:pPr>
+            <a:r>
+              <a:rPr lang="en-US" dirty="0" smtClean="0"/>
+              <a:t>}</a:t>
+            </a:r>
+          </a:p>
+          <a:p>
             <a:pPr algn="r" rtl="1"/>
             <a:r>
               <a:rPr lang="he-IL" dirty="0" smtClean="0"/>
-              <a:t>הגיע הזמן שאתם תעבדו קצת</a:t>
-            </a:r>
+              <a:t>יגרום לכך שהפעולה </a:t>
+            </a:r>
+            <a:r>
+              <a:rPr lang="en-US" dirty="0" err="1" smtClean="0"/>
+              <a:t>do_action</a:t>
+            </a:r>
+            <a:r>
+              <a:rPr lang="he-IL" dirty="0" smtClean="0"/>
+              <a:t> תקרה באופן בלתי מוגבל, לעד. </a:t>
+            </a:r>
+            <a:endParaRPr lang="en-US" dirty="0" smtClean="0"/>
+          </a:p>
+          <a:p>
+            <a:pPr lvl="1"/>
             <a:endParaRPr lang="en-US" dirty="0"/>
           </a:p>
         </p:txBody>
@@ -6788,7 +6839,7 @@
     </p:spTree>
     <p:extLst>
       <p:ext uri="{BB962C8B-B14F-4D97-AF65-F5344CB8AC3E}">
-        <p14:creationId xmlns:p14="http://schemas.microsoft.com/office/powerpoint/2010/main" val="1797245448"/>
+        <p14:creationId xmlns:p14="http://schemas.microsoft.com/office/powerpoint/2010/main" val="1279863772"/>
       </p:ext>
     </p:extLst>
   </p:cSld>
@@ -7513,7 +7564,7 @@
             </a:r>
             <a:r>
               <a:rPr lang="en-US" dirty="0" err="1" smtClean="0"/>
-              <a:t>AryehRobot</a:t>
+              <a:t>SpiralSeeker</a:t>
             </a:r>
             <a:endParaRPr lang="en-US" dirty="0" smtClean="0"/>
           </a:p>
@@ -7693,8 +7744,8 @@
               <a:t>אריה: </a:t>
             </a:r>
             <a:r>
-              <a:rPr lang="en-US" dirty="0" smtClean="0"/>
-              <a:t>TODO</a:t>
+              <a:rPr lang="he-IL" dirty="0" smtClean="0"/>
+              <a:t>מוצא מטרה, מסתובב סביבה במעגל, יורה לכיוונה כשאני קרוב</a:t>
             </a:r>
             <a:endParaRPr lang="he-IL" dirty="0" smtClean="0"/>
           </a:p>
@@ -7913,134 +7964,6 @@
           <a:p>
             <a:r>
               <a:rPr lang="he-IL" dirty="0" smtClean="0"/>
-              <a:t>דוגמת לולאה בסיסית</a:t>
-            </a:r>
-            <a:endParaRPr lang="en-US" dirty="0"/>
-          </a:p>
-        </p:txBody>
-      </p:sp>
-      <p:sp>
-        <p:nvSpPr>
-          <p:cNvPr id="3" name="מציין מיקום תוכן 2"/>
-          <p:cNvSpPr>
-            <a:spLocks noGrp="1"/>
-          </p:cNvSpPr>
-          <p:nvPr>
-            <p:ph idx="1"/>
-          </p:nvPr>
-        </p:nvSpPr>
-        <p:spPr/>
-        <p:txBody>
-          <a:bodyPr/>
-          <a:lstStyle/>
-          <a:p>
-            <a:pPr marL="0" indent="0">
-              <a:buNone/>
-            </a:pPr>
-            <a:r>
-              <a:rPr lang="en-US" dirty="0"/>
-              <a:t>w</a:t>
-            </a:r>
-            <a:r>
-              <a:rPr lang="en-US" dirty="0" smtClean="0"/>
-              <a:t>hile ( true ) {</a:t>
-            </a:r>
-          </a:p>
-          <a:p>
-            <a:pPr marL="0" indent="0">
-              <a:buNone/>
-            </a:pPr>
-            <a:r>
-              <a:rPr lang="en-US" dirty="0"/>
-              <a:t>	</a:t>
-            </a:r>
-            <a:r>
-              <a:rPr lang="en-US" dirty="0" err="1" smtClean="0"/>
-              <a:t>do_action</a:t>
-            </a:r>
-            <a:r>
-              <a:rPr lang="en-US" dirty="0" smtClean="0"/>
-              <a:t>();</a:t>
-            </a:r>
-          </a:p>
-          <a:p>
-            <a:pPr marL="0" indent="0">
-              <a:buNone/>
-            </a:pPr>
-            <a:r>
-              <a:rPr lang="en-US" dirty="0" smtClean="0"/>
-              <a:t>}</a:t>
-            </a:r>
-          </a:p>
-          <a:p>
-            <a:pPr algn="r" rtl="1"/>
-            <a:r>
-              <a:rPr lang="he-IL" dirty="0" smtClean="0"/>
-              <a:t>יגרום לכך שהפעולה </a:t>
-            </a:r>
-            <a:r>
-              <a:rPr lang="en-US" dirty="0" err="1" smtClean="0"/>
-              <a:t>do_action</a:t>
-            </a:r>
-            <a:r>
-              <a:rPr lang="he-IL" dirty="0" smtClean="0"/>
-              <a:t> תקרה באופן בלתי מוגבל, לעד. </a:t>
-            </a:r>
-            <a:endParaRPr lang="en-US" dirty="0" smtClean="0"/>
-          </a:p>
-          <a:p>
-            <a:pPr lvl="1"/>
-            <a:endParaRPr lang="en-US" dirty="0"/>
-          </a:p>
-        </p:txBody>
-      </p:sp>
-    </p:spTree>
-    <p:extLst>
-      <p:ext uri="{BB962C8B-B14F-4D97-AF65-F5344CB8AC3E}">
-        <p14:creationId xmlns:p14="http://schemas.microsoft.com/office/powerpoint/2010/main" val="1279863772"/>
-      </p:ext>
-    </p:extLst>
-  </p:cSld>
-  <p:clrMapOvr>
-    <a:masterClrMapping/>
-  </p:clrMapOvr>
-</p:sld>
-</file>
-
-<file path=ppt/slides/slide8.xml><?xml version="1.0" encoding="utf-8"?>
-<p:sld xmlns:a="http://schemas.openxmlformats.org/drawingml/2006/main" xmlns:r="http://schemas.openxmlformats.org/officeDocument/2006/relationships" xmlns:p="http://schemas.openxmlformats.org/presentationml/2006/main">
-  <p:cSld>
-    <p:spTree>
-      <p:nvGrpSpPr>
-        <p:cNvPr id="1" name=""/>
-        <p:cNvGrpSpPr/>
-        <p:nvPr/>
-      </p:nvGrpSpPr>
-      <p:grpSpPr>
-        <a:xfrm>
-          <a:off x="0" y="0"/>
-          <a:ext cx="0" cy="0"/>
-          <a:chOff x="0" y="0"/>
-          <a:chExt cx="0" cy="0"/>
-        </a:xfrm>
-      </p:grpSpPr>
-      <p:sp>
-        <p:nvSpPr>
-          <p:cNvPr id="2" name="כותרת 1"/>
-          <p:cNvSpPr>
-            <a:spLocks noGrp="1"/>
-          </p:cNvSpPr>
-          <p:nvPr>
-            <p:ph type="title"/>
-          </p:nvPr>
-        </p:nvSpPr>
-        <p:spPr/>
-        <p:txBody>
-          <a:bodyPr/>
-          <a:lstStyle/>
-          <a:p>
-            <a:r>
-              <a:rPr lang="he-IL" dirty="0" smtClean="0"/>
               <a:t>מה רובוט יודע לעשות?</a:t>
             </a:r>
             <a:endParaRPr lang="en-US" dirty="0"/>
@@ -8144,7 +8067,7 @@
 </p:sld>
 </file>
 
-<file path=ppt/slides/slide9.xml><?xml version="1.0" encoding="utf-8"?>
+<file path=ppt/slides/slide8.xml><?xml version="1.0" encoding="utf-8"?>
 <p:sld xmlns:a="http://schemas.openxmlformats.org/drawingml/2006/main" xmlns:r="http://schemas.openxmlformats.org/officeDocument/2006/relationships" xmlns:p="http://schemas.openxmlformats.org/presentationml/2006/main">
   <p:cSld>
     <p:spTree>
@@ -8259,6 +8182,83 @@
     <p:extLst>
       <p:ext uri="{BB962C8B-B14F-4D97-AF65-F5344CB8AC3E}">
         <p14:creationId xmlns:p14="http://schemas.microsoft.com/office/powerpoint/2010/main" val="1116886614"/>
+      </p:ext>
+    </p:extLst>
+  </p:cSld>
+  <p:clrMapOvr>
+    <a:masterClrMapping/>
+  </p:clrMapOvr>
+</p:sld>
+</file>
+
+<file path=ppt/slides/slide9.xml><?xml version="1.0" encoding="utf-8"?>
+<p:sld xmlns:a="http://schemas.openxmlformats.org/drawingml/2006/main" xmlns:r="http://schemas.openxmlformats.org/officeDocument/2006/relationships" xmlns:p="http://schemas.openxmlformats.org/presentationml/2006/main">
+  <p:cSld>
+    <p:spTree>
+      <p:nvGrpSpPr>
+        <p:cNvPr id="1" name=""/>
+        <p:cNvGrpSpPr/>
+        <p:nvPr/>
+      </p:nvGrpSpPr>
+      <p:grpSpPr>
+        <a:xfrm>
+          <a:off x="0" y="0"/>
+          <a:ext cx="0" cy="0"/>
+          <a:chOff x="0" y="0"/>
+          <a:chExt cx="0" cy="0"/>
+        </a:xfrm>
+      </p:grpSpPr>
+      <p:sp>
+        <p:nvSpPr>
+          <p:cNvPr id="2" name="כותרת 1"/>
+          <p:cNvSpPr>
+            <a:spLocks noGrp="1"/>
+          </p:cNvSpPr>
+          <p:nvPr>
+            <p:ph type="title"/>
+          </p:nvPr>
+        </p:nvSpPr>
+        <p:spPr/>
+        <p:txBody>
+          <a:bodyPr/>
+          <a:lstStyle/>
+          <a:p>
+            <a:r>
+              <a:rPr lang="he-IL" dirty="0" smtClean="0"/>
+              <a:t>די עם ההדגמות</a:t>
+            </a:r>
+            <a:endParaRPr lang="en-US" dirty="0"/>
+          </a:p>
+        </p:txBody>
+      </p:sp>
+      <p:sp>
+        <p:nvSpPr>
+          <p:cNvPr id="3" name="מציין מיקום תוכן 2"/>
+          <p:cNvSpPr>
+            <a:spLocks noGrp="1"/>
+          </p:cNvSpPr>
+          <p:nvPr>
+            <p:ph idx="1"/>
+          </p:nvPr>
+        </p:nvSpPr>
+        <p:spPr/>
+        <p:txBody>
+          <a:bodyPr/>
+          <a:lstStyle/>
+          <a:p>
+            <a:pPr algn="r" rtl="1"/>
+            <a:r>
+              <a:rPr lang="he-IL" dirty="0" smtClean="0"/>
+              <a:t>הגיע הזמן שאתם תעבדו קצת</a:t>
+            </a:r>
+            <a:endParaRPr lang="en-US" dirty="0"/>
+          </a:p>
+        </p:txBody>
+      </p:sp>
+    </p:spTree>
+    <p:extLst>
+      <p:ext uri="{BB962C8B-B14F-4D97-AF65-F5344CB8AC3E}">
+        <p14:creationId xmlns:p14="http://schemas.microsoft.com/office/powerpoint/2010/main" val="1797245448"/>
       </p:ext>
     </p:extLst>
   </p:cSld>

</xml_diff>